<commit_message>
Removed obsolete slide from abstract factory slide set.
</commit_message>
<xml_diff>
--- a/slides/401 - Abstract factory.pptx
+++ b/slides/401 - Abstract factory.pptx
@@ -29,8 +29,7 @@
     <p:sldId id="374" r:id="rId23"/>
     <p:sldId id="357" r:id="rId24"/>
     <p:sldId id="359" r:id="rId25"/>
-    <p:sldId id="364" r:id="rId26"/>
-    <p:sldId id="366" r:id="rId27"/>
+    <p:sldId id="366" r:id="rId26"/>
   </p:sldIdLst>
   <p:sldSz cx="12192000" cy="6858000"/>
   <p:notesSz cx="6858000" cy="9144000"/>
@@ -205,7 +204,7 @@
           <a:noFill/>
           <a:extLst>
             <a:ext uri="{909E8E84-426E-40dd-AFC4-6F175D3DCCD1}">
-              <a14:hiddenFill xmlns:a14="http://schemas.microsoft.com/office/drawing/2010/main" xmlns="">
+              <a14:hiddenFill xmlns="" xmlns:a14="http://schemas.microsoft.com/office/drawing/2010/main">
                 <a:solidFill>
                   <a:srgbClr val="FFFFFF"/>
                 </a:solidFill>
@@ -264,7 +263,7 @@
             </a:ln>
             <a:extLst>
               <a:ext uri="{91240B29-F687-4f45-9708-019B960494DF}">
-                <a14:hiddenLine xmlns:a14="http://schemas.microsoft.com/office/drawing/2010/main" xmlns="" w="9525">
+                <a14:hiddenLine xmlns="" xmlns:a14="http://schemas.microsoft.com/office/drawing/2010/main" w="9525">
                   <a:solidFill>
                     <a:srgbClr val="000000"/>
                   </a:solidFill>
@@ -354,7 +353,7 @@
             </a:ln>
             <a:extLst>
               <a:ext uri="{91240B29-F687-4f45-9708-019B960494DF}">
-                <a14:hiddenLine xmlns:a14="http://schemas.microsoft.com/office/drawing/2010/main" xmlns="" w="9525">
+                <a14:hiddenLine xmlns="" xmlns:a14="http://schemas.microsoft.com/office/drawing/2010/main" w="9525">
                   <a:solidFill>
                     <a:srgbClr val="000000"/>
                   </a:solidFill>
@@ -444,7 +443,7 @@
             </a:ln>
             <a:extLst>
               <a:ext uri="{91240B29-F687-4f45-9708-019B960494DF}">
-                <a14:hiddenLine xmlns:a14="http://schemas.microsoft.com/office/drawing/2010/main" xmlns="" w="9525">
+                <a14:hiddenLine xmlns="" xmlns:a14="http://schemas.microsoft.com/office/drawing/2010/main" w="9525">
                   <a:solidFill>
                     <a:srgbClr val="000000"/>
                   </a:solidFill>
@@ -478,7 +477,7 @@
             </a:ln>
             <a:extLst>
               <a:ext uri="{91240B29-F687-4f45-9708-019B960494DF}">
-                <a14:hiddenLine xmlns:a14="http://schemas.microsoft.com/office/drawing/2010/main" xmlns="" w="9525">
+                <a14:hiddenLine xmlns="" xmlns:a14="http://schemas.microsoft.com/office/drawing/2010/main" w="9525">
                   <a:solidFill>
                     <a:srgbClr val="000000"/>
                   </a:solidFill>
@@ -568,7 +567,7 @@
             </a:ln>
             <a:extLst>
               <a:ext uri="{91240B29-F687-4f45-9708-019B960494DF}">
-                <a14:hiddenLine xmlns:a14="http://schemas.microsoft.com/office/drawing/2010/main" xmlns="" w="9525">
+                <a14:hiddenLine xmlns="" xmlns:a14="http://schemas.microsoft.com/office/drawing/2010/main" w="9525">
                   <a:solidFill>
                     <a:srgbClr val="000000"/>
                   </a:solidFill>
@@ -630,7 +629,7 @@
             </a:ln>
             <a:extLst>
               <a:ext uri="{91240B29-F687-4f45-9708-019B960494DF}">
-                <a14:hiddenLine xmlns:a14="http://schemas.microsoft.com/office/drawing/2010/main" xmlns="" w="9525">
+                <a14:hiddenLine xmlns="" xmlns:a14="http://schemas.microsoft.com/office/drawing/2010/main" w="9525">
                   <a:solidFill>
                     <a:srgbClr val="000000"/>
                   </a:solidFill>
@@ -692,7 +691,7 @@
             </a:ln>
             <a:extLst>
               <a:ext uri="{91240B29-F687-4f45-9708-019B960494DF}">
-                <a14:hiddenLine xmlns:a14="http://schemas.microsoft.com/office/drawing/2010/main" xmlns="" w="9525">
+                <a14:hiddenLine xmlns="" xmlns:a14="http://schemas.microsoft.com/office/drawing/2010/main" w="9525">
                   <a:solidFill>
                     <a:srgbClr val="000000"/>
                   </a:solidFill>
@@ -782,7 +781,7 @@
             </a:ln>
             <a:extLst>
               <a:ext uri="{91240B29-F687-4f45-9708-019B960494DF}">
-                <a14:hiddenLine xmlns:a14="http://schemas.microsoft.com/office/drawing/2010/main" xmlns="" w="9525">
+                <a14:hiddenLine xmlns="" xmlns:a14="http://schemas.microsoft.com/office/drawing/2010/main" w="9525">
                   <a:solidFill>
                     <a:srgbClr val="000000"/>
                   </a:solidFill>
@@ -844,7 +843,7 @@
             </a:ln>
             <a:extLst>
               <a:ext uri="{91240B29-F687-4f45-9708-019B960494DF}">
-                <a14:hiddenLine xmlns:a14="http://schemas.microsoft.com/office/drawing/2010/main" xmlns="" w="9525">
+                <a14:hiddenLine xmlns="" xmlns:a14="http://schemas.microsoft.com/office/drawing/2010/main" w="9525">
                   <a:solidFill>
                     <a:srgbClr val="000000"/>
                   </a:solidFill>
@@ -906,7 +905,7 @@
             </a:ln>
             <a:extLst>
               <a:ext uri="{91240B29-F687-4f45-9708-019B960494DF}">
-                <a14:hiddenLine xmlns:a14="http://schemas.microsoft.com/office/drawing/2010/main" xmlns="" w="9525">
+                <a14:hiddenLine xmlns="" xmlns:a14="http://schemas.microsoft.com/office/drawing/2010/main" w="9525">
                   <a:solidFill>
                     <a:srgbClr val="000000"/>
                   </a:solidFill>
@@ -996,7 +995,7 @@
             </a:ln>
             <a:extLst>
               <a:ext uri="{91240B29-F687-4f45-9708-019B960494DF}">
-                <a14:hiddenLine xmlns:a14="http://schemas.microsoft.com/office/drawing/2010/main" xmlns="" w="9525">
+                <a14:hiddenLine xmlns="" xmlns:a14="http://schemas.microsoft.com/office/drawing/2010/main" w="9525">
                   <a:solidFill>
                     <a:srgbClr val="000000"/>
                   </a:solidFill>
@@ -1086,7 +1085,7 @@
             </a:ln>
             <a:extLst>
               <a:ext uri="{91240B29-F687-4f45-9708-019B960494DF}">
-                <a14:hiddenLine xmlns:a14="http://schemas.microsoft.com/office/drawing/2010/main" xmlns="" w="9525">
+                <a14:hiddenLine xmlns="" xmlns:a14="http://schemas.microsoft.com/office/drawing/2010/main" w="9525">
                   <a:solidFill>
                     <a:srgbClr val="000000"/>
                   </a:solidFill>
@@ -1148,7 +1147,7 @@
             </a:ln>
             <a:extLst>
               <a:ext uri="{91240B29-F687-4f45-9708-019B960494DF}">
-                <a14:hiddenLine xmlns:a14="http://schemas.microsoft.com/office/drawing/2010/main" xmlns="" w="9525">
+                <a14:hiddenLine xmlns="" xmlns:a14="http://schemas.microsoft.com/office/drawing/2010/main" w="9525">
                   <a:solidFill>
                     <a:srgbClr val="000000"/>
                   </a:solidFill>
@@ -1258,7 +1257,7 @@
             </a:ln>
             <a:extLst>
               <a:ext uri="{91240B29-F687-4f45-9708-019B960494DF}">
-                <a14:hiddenLine xmlns:a14="http://schemas.microsoft.com/office/drawing/2010/main" xmlns="" w="9525">
+                <a14:hiddenLine xmlns="" xmlns:a14="http://schemas.microsoft.com/office/drawing/2010/main" w="9525">
                   <a:solidFill>
                     <a:srgbClr val="000000"/>
                   </a:solidFill>
@@ -1320,7 +1319,7 @@
             </a:ln>
             <a:extLst>
               <a:ext uri="{91240B29-F687-4f45-9708-019B960494DF}">
-                <a14:hiddenLine xmlns:a14="http://schemas.microsoft.com/office/drawing/2010/main" xmlns="" w="9525">
+                <a14:hiddenLine xmlns="" xmlns:a14="http://schemas.microsoft.com/office/drawing/2010/main" w="9525">
                   <a:solidFill>
                     <a:srgbClr val="000000"/>
                   </a:solidFill>
@@ -1410,7 +1409,7 @@
             </a:ln>
             <a:extLst>
               <a:ext uri="{91240B29-F687-4f45-9708-019B960494DF}">
-                <a14:hiddenLine xmlns:a14="http://schemas.microsoft.com/office/drawing/2010/main" xmlns="" w="9525">
+                <a14:hiddenLine xmlns="" xmlns:a14="http://schemas.microsoft.com/office/drawing/2010/main" w="9525">
                   <a:solidFill>
                     <a:srgbClr val="000000"/>
                   </a:solidFill>
@@ -1500,7 +1499,7 @@
             </a:ln>
             <a:extLst>
               <a:ext uri="{91240B29-F687-4f45-9708-019B960494DF}">
-                <a14:hiddenLine xmlns:a14="http://schemas.microsoft.com/office/drawing/2010/main" xmlns="" w="9525">
+                <a14:hiddenLine xmlns="" xmlns:a14="http://schemas.microsoft.com/office/drawing/2010/main" w="9525">
                   <a:solidFill>
                     <a:srgbClr val="000000"/>
                   </a:solidFill>
@@ -1562,7 +1561,7 @@
             </a:ln>
             <a:extLst>
               <a:ext uri="{91240B29-F687-4f45-9708-019B960494DF}">
-                <a14:hiddenLine xmlns:a14="http://schemas.microsoft.com/office/drawing/2010/main" xmlns="" w="9525">
+                <a14:hiddenLine xmlns="" xmlns:a14="http://schemas.microsoft.com/office/drawing/2010/main" w="9525">
                   <a:solidFill>
                     <a:srgbClr val="000000"/>
                   </a:solidFill>
@@ -1652,7 +1651,7 @@
             </a:ln>
             <a:extLst>
               <a:ext uri="{91240B29-F687-4f45-9708-019B960494DF}">
-                <a14:hiddenLine xmlns:a14="http://schemas.microsoft.com/office/drawing/2010/main" xmlns="" w="9525">
+                <a14:hiddenLine xmlns="" xmlns:a14="http://schemas.microsoft.com/office/drawing/2010/main" w="9525">
                   <a:solidFill>
                     <a:srgbClr val="000000"/>
                   </a:solidFill>
@@ -1742,7 +1741,7 @@
             </a:ln>
             <a:extLst>
               <a:ext uri="{91240B29-F687-4f45-9708-019B960494DF}">
-                <a14:hiddenLine xmlns:a14="http://schemas.microsoft.com/office/drawing/2010/main" xmlns="" w="9525">
+                <a14:hiddenLine xmlns="" xmlns:a14="http://schemas.microsoft.com/office/drawing/2010/main" w="9525">
                   <a:solidFill>
                     <a:srgbClr val="000000"/>
                   </a:solidFill>
@@ -1798,7 +1797,7 @@
             </a:ln>
             <a:extLst>
               <a:ext uri="{91240B29-F687-4f45-9708-019B960494DF}">
-                <a14:hiddenLine xmlns:a14="http://schemas.microsoft.com/office/drawing/2010/main" xmlns="" w="9525">
+                <a14:hiddenLine xmlns="" xmlns:a14="http://schemas.microsoft.com/office/drawing/2010/main" w="9525">
                   <a:solidFill>
                     <a:srgbClr val="000000"/>
                   </a:solidFill>
@@ -1888,7 +1887,7 @@
             </a:ln>
             <a:extLst>
               <a:ext uri="{91240B29-F687-4f45-9708-019B960494DF}">
-                <a14:hiddenLine xmlns:a14="http://schemas.microsoft.com/office/drawing/2010/main" xmlns="" w="9525">
+                <a14:hiddenLine xmlns="" xmlns:a14="http://schemas.microsoft.com/office/drawing/2010/main" w="9525">
                   <a:solidFill>
                     <a:srgbClr val="000000"/>
                   </a:solidFill>
@@ -1944,7 +1943,7 @@
             </a:ln>
             <a:extLst>
               <a:ext uri="{91240B29-F687-4f45-9708-019B960494DF}">
-                <a14:hiddenLine xmlns:a14="http://schemas.microsoft.com/office/drawing/2010/main" xmlns="" w="9525">
+                <a14:hiddenLine xmlns="" xmlns:a14="http://schemas.microsoft.com/office/drawing/2010/main" w="9525">
                   <a:solidFill>
                     <a:srgbClr val="000000"/>
                   </a:solidFill>
@@ -2034,7 +2033,7 @@
             </a:ln>
             <a:extLst>
               <a:ext uri="{91240B29-F687-4f45-9708-019B960494DF}">
-                <a14:hiddenLine xmlns:a14="http://schemas.microsoft.com/office/drawing/2010/main" xmlns="" w="9525">
+                <a14:hiddenLine xmlns="" xmlns:a14="http://schemas.microsoft.com/office/drawing/2010/main" w="9525">
                   <a:solidFill>
                     <a:srgbClr val="000000"/>
                   </a:solidFill>
@@ -2102,7 +2101,7 @@
             </a:ln>
             <a:extLst>
               <a:ext uri="{91240B29-F687-4f45-9708-019B960494DF}">
-                <a14:hiddenLine xmlns:a14="http://schemas.microsoft.com/office/drawing/2010/main" xmlns="" w="9525">
+                <a14:hiddenLine xmlns="" xmlns:a14="http://schemas.microsoft.com/office/drawing/2010/main" w="9525">
                   <a:solidFill>
                     <a:srgbClr val="000000"/>
                   </a:solidFill>
@@ -2192,7 +2191,7 @@
             </a:ln>
             <a:extLst>
               <a:ext uri="{91240B29-F687-4f45-9708-019B960494DF}">
-                <a14:hiddenLine xmlns:a14="http://schemas.microsoft.com/office/drawing/2010/main" xmlns="" w="9525">
+                <a14:hiddenLine xmlns="" xmlns:a14="http://schemas.microsoft.com/office/drawing/2010/main" w="9525">
                   <a:solidFill>
                     <a:srgbClr val="000000"/>
                   </a:solidFill>
@@ -2260,7 +2259,7 @@
             </a:ln>
             <a:extLst>
               <a:ext uri="{91240B29-F687-4f45-9708-019B960494DF}">
-                <a14:hiddenLine xmlns:a14="http://schemas.microsoft.com/office/drawing/2010/main" xmlns="" w="9525">
+                <a14:hiddenLine xmlns="" xmlns:a14="http://schemas.microsoft.com/office/drawing/2010/main" w="9525">
                   <a:solidFill>
                     <a:srgbClr val="000000"/>
                   </a:solidFill>
@@ -2350,7 +2349,7 @@
             </a:ln>
             <a:extLst>
               <a:ext uri="{91240B29-F687-4f45-9708-019B960494DF}">
-                <a14:hiddenLine xmlns:a14="http://schemas.microsoft.com/office/drawing/2010/main" xmlns="" w="9525">
+                <a14:hiddenLine xmlns="" xmlns:a14="http://schemas.microsoft.com/office/drawing/2010/main" w="9525">
                   <a:solidFill>
                     <a:srgbClr val="000000"/>
                   </a:solidFill>
@@ -2384,7 +2383,7 @@
             </a:ln>
             <a:extLst>
               <a:ext uri="{91240B29-F687-4f45-9708-019B960494DF}">
-                <a14:hiddenLine xmlns:a14="http://schemas.microsoft.com/office/drawing/2010/main" xmlns="" w="9525">
+                <a14:hiddenLine xmlns="" xmlns:a14="http://schemas.microsoft.com/office/drawing/2010/main" w="9525">
                   <a:solidFill>
                     <a:srgbClr val="000000"/>
                   </a:solidFill>
@@ -2474,7 +2473,7 @@
             </a:ln>
             <a:extLst>
               <a:ext uri="{91240B29-F687-4f45-9708-019B960494DF}">
-                <a14:hiddenLine xmlns:a14="http://schemas.microsoft.com/office/drawing/2010/main" xmlns="" w="9525">
+                <a14:hiddenLine xmlns="" xmlns:a14="http://schemas.microsoft.com/office/drawing/2010/main" w="9525">
                   <a:solidFill>
                     <a:srgbClr val="000000"/>
                   </a:solidFill>
@@ -2536,7 +2535,7 @@
             </a:ln>
             <a:extLst>
               <a:ext uri="{91240B29-F687-4f45-9708-019B960494DF}">
-                <a14:hiddenLine xmlns:a14="http://schemas.microsoft.com/office/drawing/2010/main" xmlns="" w="9525">
+                <a14:hiddenLine xmlns="" xmlns:a14="http://schemas.microsoft.com/office/drawing/2010/main" w="9525">
                   <a:solidFill>
                     <a:srgbClr val="000000"/>
                   </a:solidFill>
@@ -2598,7 +2597,7 @@
             </a:ln>
             <a:extLst>
               <a:ext uri="{91240B29-F687-4f45-9708-019B960494DF}">
-                <a14:hiddenLine xmlns:a14="http://schemas.microsoft.com/office/drawing/2010/main" xmlns="" w="9525">
+                <a14:hiddenLine xmlns="" xmlns:a14="http://schemas.microsoft.com/office/drawing/2010/main" w="9525">
                   <a:solidFill>
                     <a:srgbClr val="000000"/>
                   </a:solidFill>
@@ -2688,7 +2687,7 @@
             </a:ln>
             <a:extLst>
               <a:ext uri="{91240B29-F687-4f45-9708-019B960494DF}">
-                <a14:hiddenLine xmlns:a14="http://schemas.microsoft.com/office/drawing/2010/main" xmlns="" w="9525">
+                <a14:hiddenLine xmlns="" xmlns:a14="http://schemas.microsoft.com/office/drawing/2010/main" w="9525">
                   <a:solidFill>
                     <a:srgbClr val="000000"/>
                   </a:solidFill>
@@ -2756,7 +2755,7 @@
             </a:ln>
             <a:extLst>
               <a:ext uri="{91240B29-F687-4f45-9708-019B960494DF}">
-                <a14:hiddenLine xmlns:a14="http://schemas.microsoft.com/office/drawing/2010/main" xmlns="" w="9525">
+                <a14:hiddenLine xmlns="" xmlns:a14="http://schemas.microsoft.com/office/drawing/2010/main" w="9525">
                   <a:solidFill>
                     <a:srgbClr val="000000"/>
                   </a:solidFill>
@@ -2818,7 +2817,7 @@
             </a:ln>
             <a:extLst>
               <a:ext uri="{91240B29-F687-4f45-9708-019B960494DF}">
-                <a14:hiddenLine xmlns:a14="http://schemas.microsoft.com/office/drawing/2010/main" xmlns="" w="9525">
+                <a14:hiddenLine xmlns="" xmlns:a14="http://schemas.microsoft.com/office/drawing/2010/main" w="9525">
                   <a:solidFill>
                     <a:srgbClr val="000000"/>
                   </a:solidFill>
@@ -2908,7 +2907,7 @@
             </a:ln>
             <a:extLst>
               <a:ext uri="{91240B29-F687-4f45-9708-019B960494DF}">
-                <a14:hiddenLine xmlns:a14="http://schemas.microsoft.com/office/drawing/2010/main" xmlns="" w="9525">
+                <a14:hiddenLine xmlns="" xmlns:a14="http://schemas.microsoft.com/office/drawing/2010/main" w="9525">
                   <a:solidFill>
                     <a:srgbClr val="000000"/>
                   </a:solidFill>
@@ -2970,7 +2969,7 @@
             </a:ln>
             <a:extLst>
               <a:ext uri="{91240B29-F687-4f45-9708-019B960494DF}">
-                <a14:hiddenLine xmlns:a14="http://schemas.microsoft.com/office/drawing/2010/main" xmlns="" w="9525">
+                <a14:hiddenLine xmlns="" xmlns:a14="http://schemas.microsoft.com/office/drawing/2010/main" w="9525">
                   <a:solidFill>
                     <a:srgbClr val="000000"/>
                   </a:solidFill>
@@ -3060,7 +3059,7 @@
             </a:ln>
             <a:extLst>
               <a:ext uri="{91240B29-F687-4f45-9708-019B960494DF}">
-                <a14:hiddenLine xmlns:a14="http://schemas.microsoft.com/office/drawing/2010/main" xmlns="" w="9525">
+                <a14:hiddenLine xmlns="" xmlns:a14="http://schemas.microsoft.com/office/drawing/2010/main" w="9525">
                   <a:solidFill>
                     <a:srgbClr val="000000"/>
                   </a:solidFill>
@@ -3122,7 +3121,7 @@
             </a:ln>
             <a:extLst>
               <a:ext uri="{91240B29-F687-4f45-9708-019B960494DF}">
-                <a14:hiddenLine xmlns:a14="http://schemas.microsoft.com/office/drawing/2010/main" xmlns="" w="9525">
+                <a14:hiddenLine xmlns="" xmlns:a14="http://schemas.microsoft.com/office/drawing/2010/main" w="9525">
                   <a:solidFill>
                     <a:srgbClr val="000000"/>
                   </a:solidFill>
@@ -3212,7 +3211,7 @@
             </a:ln>
             <a:extLst>
               <a:ext uri="{91240B29-F687-4f45-9708-019B960494DF}">
-                <a14:hiddenLine xmlns:a14="http://schemas.microsoft.com/office/drawing/2010/main" xmlns="" w="9525">
+                <a14:hiddenLine xmlns="" xmlns:a14="http://schemas.microsoft.com/office/drawing/2010/main" w="9525">
                   <a:solidFill>
                     <a:srgbClr val="000000"/>
                   </a:solidFill>
@@ -3246,7 +3245,7 @@
             </a:ln>
             <a:extLst>
               <a:ext uri="{91240B29-F687-4f45-9708-019B960494DF}">
-                <a14:hiddenLine xmlns:a14="http://schemas.microsoft.com/office/drawing/2010/main" xmlns="" w="9525">
+                <a14:hiddenLine xmlns="" xmlns:a14="http://schemas.microsoft.com/office/drawing/2010/main" w="9525">
                   <a:solidFill>
                     <a:srgbClr val="000000"/>
                   </a:solidFill>
@@ -3311,7 +3310,7 @@
             </a:ln>
             <a:extLst>
               <a:ext uri="{91240B29-F687-4f45-9708-019B960494DF}">
-                <a14:hiddenLine xmlns:a14="http://schemas.microsoft.com/office/drawing/2010/main" xmlns="" w="9525">
+                <a14:hiddenLine xmlns="" xmlns:a14="http://schemas.microsoft.com/office/drawing/2010/main" w="9525">
                   <a:solidFill>
                     <a:srgbClr val="000000"/>
                   </a:solidFill>
@@ -3401,7 +3400,7 @@
             </a:ln>
             <a:extLst>
               <a:ext uri="{91240B29-F687-4f45-9708-019B960494DF}">
-                <a14:hiddenLine xmlns:a14="http://schemas.microsoft.com/office/drawing/2010/main" xmlns="" w="9525">
+                <a14:hiddenLine xmlns="" xmlns:a14="http://schemas.microsoft.com/office/drawing/2010/main" w="9525">
                   <a:solidFill>
                     <a:srgbClr val="000000"/>
                   </a:solidFill>
@@ -3463,7 +3462,7 @@
             </a:ln>
             <a:extLst>
               <a:ext uri="{91240B29-F687-4f45-9708-019B960494DF}">
-                <a14:hiddenLine xmlns:a14="http://schemas.microsoft.com/office/drawing/2010/main" xmlns="" w="9525">
+                <a14:hiddenLine xmlns="" xmlns:a14="http://schemas.microsoft.com/office/drawing/2010/main" w="9525">
                   <a:solidFill>
                     <a:srgbClr val="000000"/>
                   </a:solidFill>
@@ -3553,7 +3552,7 @@
             </a:ln>
             <a:extLst>
               <a:ext uri="{91240B29-F687-4f45-9708-019B960494DF}">
-                <a14:hiddenLine xmlns:a14="http://schemas.microsoft.com/office/drawing/2010/main" xmlns="" w="9525">
+                <a14:hiddenLine xmlns="" xmlns:a14="http://schemas.microsoft.com/office/drawing/2010/main" w="9525">
                   <a:solidFill>
                     <a:srgbClr val="000000"/>
                   </a:solidFill>
@@ -3643,7 +3642,7 @@
             </a:ln>
             <a:extLst>
               <a:ext uri="{91240B29-F687-4f45-9708-019B960494DF}">
-                <a14:hiddenLine xmlns:a14="http://schemas.microsoft.com/office/drawing/2010/main" xmlns="" w="9525">
+                <a14:hiddenLine xmlns="" xmlns:a14="http://schemas.microsoft.com/office/drawing/2010/main" w="9525">
                   <a:solidFill>
                     <a:srgbClr val="000000"/>
                   </a:solidFill>
@@ -3708,7 +3707,7 @@
             </a:ln>
             <a:extLst>
               <a:ext uri="{91240B29-F687-4f45-9708-019B960494DF}">
-                <a14:hiddenLine xmlns:a14="http://schemas.microsoft.com/office/drawing/2010/main" xmlns="" w="9525">
+                <a14:hiddenLine xmlns="" xmlns:a14="http://schemas.microsoft.com/office/drawing/2010/main" w="9525">
                   <a:solidFill>
                     <a:srgbClr val="000000"/>
                   </a:solidFill>
@@ -3770,7 +3769,7 @@
             </a:ln>
             <a:extLst>
               <a:ext uri="{91240B29-F687-4f45-9708-019B960494DF}">
-                <a14:hiddenLine xmlns:a14="http://schemas.microsoft.com/office/drawing/2010/main" xmlns="" w="9525">
+                <a14:hiddenLine xmlns="" xmlns:a14="http://schemas.microsoft.com/office/drawing/2010/main" w="9525">
                   <a:solidFill>
                     <a:srgbClr val="000000"/>
                   </a:solidFill>
@@ -3860,7 +3859,7 @@
             </a:ln>
             <a:extLst>
               <a:ext uri="{91240B29-F687-4f45-9708-019B960494DF}">
-                <a14:hiddenLine xmlns:a14="http://schemas.microsoft.com/office/drawing/2010/main" xmlns="" w="9525">
+                <a14:hiddenLine xmlns="" xmlns:a14="http://schemas.microsoft.com/office/drawing/2010/main" w="9525">
                   <a:solidFill>
                     <a:srgbClr val="000000"/>
                   </a:solidFill>
@@ -3950,7 +3949,7 @@
             </a:ln>
             <a:extLst>
               <a:ext uri="{91240B29-F687-4f45-9708-019B960494DF}">
-                <a14:hiddenLine xmlns:a14="http://schemas.microsoft.com/office/drawing/2010/main" xmlns="" w="9525">
+                <a14:hiddenLine xmlns="" xmlns:a14="http://schemas.microsoft.com/office/drawing/2010/main" w="9525">
                   <a:solidFill>
                     <a:srgbClr val="000000"/>
                   </a:solidFill>
@@ -4012,7 +4011,7 @@
             </a:ln>
             <a:extLst>
               <a:ext uri="{91240B29-F687-4f45-9708-019B960494DF}">
-                <a14:hiddenLine xmlns:a14="http://schemas.microsoft.com/office/drawing/2010/main" xmlns="" w="9525">
+                <a14:hiddenLine xmlns="" xmlns:a14="http://schemas.microsoft.com/office/drawing/2010/main" w="9525">
                   <a:solidFill>
                     <a:srgbClr val="000000"/>
                   </a:solidFill>
@@ -4132,7 +4131,7 @@
             </a:ln>
             <a:extLst>
               <a:ext uri="{91240B29-F687-4f45-9708-019B960494DF}">
-                <a14:hiddenLine xmlns:a14="http://schemas.microsoft.com/office/drawing/2010/main" xmlns="" w="9525">
+                <a14:hiddenLine xmlns="" xmlns:a14="http://schemas.microsoft.com/office/drawing/2010/main" w="9525">
                   <a:solidFill>
                     <a:srgbClr val="000000"/>
                   </a:solidFill>
@@ -4200,7 +4199,7 @@
             </a:ln>
             <a:extLst>
               <a:ext uri="{91240B29-F687-4f45-9708-019B960494DF}">
-                <a14:hiddenLine xmlns:a14="http://schemas.microsoft.com/office/drawing/2010/main" xmlns="" w="9525">
+                <a14:hiddenLine xmlns="" xmlns:a14="http://schemas.microsoft.com/office/drawing/2010/main" w="9525">
                   <a:solidFill>
                     <a:srgbClr val="000000"/>
                   </a:solidFill>
@@ -4290,7 +4289,7 @@
             </a:ln>
             <a:extLst>
               <a:ext uri="{91240B29-F687-4f45-9708-019B960494DF}">
-                <a14:hiddenLine xmlns:a14="http://schemas.microsoft.com/office/drawing/2010/main" xmlns="" w="9525">
+                <a14:hiddenLine xmlns="" xmlns:a14="http://schemas.microsoft.com/office/drawing/2010/main" w="9525">
                   <a:solidFill>
                     <a:srgbClr val="000000"/>
                   </a:solidFill>
@@ -4431,7 +4430,7 @@
             <a:fld id="{B61BEF0D-F0BB-DE4B-95CE-6DB70DBA9567}" type="datetimeFigureOut">
               <a:rPr lang="en-US" smtClean="0"/>
               <a:pPr/>
-              <a:t>9/26/19</a:t>
+              <a:t>9/30/19</a:t>
             </a:fld>
             <a:endParaRPr lang="en-US" dirty="0"/>
           </a:p>
@@ -4700,7 +4699,7 @@
             <a:fld id="{B61BEF0D-F0BB-DE4B-95CE-6DB70DBA9567}" type="datetimeFigureOut">
               <a:rPr lang="en-US" smtClean="0"/>
               <a:pPr/>
-              <a:t>9/26/19</a:t>
+              <a:t>9/30/19</a:t>
             </a:fld>
             <a:endParaRPr lang="en-US" dirty="0"/>
           </a:p>
@@ -4898,7 +4897,7 @@
             <a:fld id="{B61BEF0D-F0BB-DE4B-95CE-6DB70DBA9567}" type="datetimeFigureOut">
               <a:rPr lang="en-US" smtClean="0"/>
               <a:pPr/>
-              <a:t>9/26/19</a:t>
+              <a:t>9/30/19</a:t>
             </a:fld>
             <a:endParaRPr lang="en-US" dirty="0"/>
           </a:p>
@@ -5163,7 +5162,7 @@
             <a:fld id="{B61BEF0D-F0BB-DE4B-95CE-6DB70DBA9567}" type="datetimeFigureOut">
               <a:rPr lang="en-US" smtClean="0"/>
               <a:pPr/>
-              <a:t>9/26/19</a:t>
+              <a:t>9/30/19</a:t>
             </a:fld>
             <a:endParaRPr lang="en-US" dirty="0"/>
           </a:p>
@@ -5599,7 +5598,7 @@
             <a:fld id="{B61BEF0D-F0BB-DE4B-95CE-6DB70DBA9567}" type="datetimeFigureOut">
               <a:rPr lang="en-US" smtClean="0"/>
               <a:pPr/>
-              <a:t>9/26/19</a:t>
+              <a:t>9/30/19</a:t>
             </a:fld>
             <a:endParaRPr lang="en-US" dirty="0"/>
           </a:p>
@@ -6147,7 +6146,7 @@
             <a:fld id="{B61BEF0D-F0BB-DE4B-95CE-6DB70DBA9567}" type="datetimeFigureOut">
               <a:rPr lang="en-US" smtClean="0"/>
               <a:pPr/>
-              <a:t>9/26/19</a:t>
+              <a:t>9/30/19</a:t>
             </a:fld>
             <a:endParaRPr lang="en-US" dirty="0"/>
           </a:p>
@@ -6869,7 +6868,7 @@
             <a:fld id="{B61BEF0D-F0BB-DE4B-95CE-6DB70DBA9567}" type="datetimeFigureOut">
               <a:rPr lang="en-US" smtClean="0"/>
               <a:pPr/>
-              <a:t>9/26/19</a:t>
+              <a:t>9/30/19</a:t>
             </a:fld>
             <a:endParaRPr lang="en-US" dirty="0"/>
           </a:p>
@@ -7041,7 +7040,7 @@
             <a:fld id="{B61BEF0D-F0BB-DE4B-95CE-6DB70DBA9567}" type="datetimeFigureOut">
               <a:rPr lang="en-US" smtClean="0"/>
               <a:pPr/>
-              <a:t>9/26/19</a:t>
+              <a:t>9/30/19</a:t>
             </a:fld>
             <a:endParaRPr lang="en-US" dirty="0"/>
           </a:p>
@@ -7223,7 +7222,7 @@
             <a:fld id="{B61BEF0D-F0BB-DE4B-95CE-6DB70DBA9567}" type="datetimeFigureOut">
               <a:rPr lang="en-US" smtClean="0"/>
               <a:pPr/>
-              <a:t>9/26/19</a:t>
+              <a:t>9/30/19</a:t>
             </a:fld>
             <a:endParaRPr lang="en-US" dirty="0"/>
           </a:p>
@@ -7412,7 +7411,7 @@
             <a:fld id="{B61BEF0D-F0BB-DE4B-95CE-6DB70DBA9567}" type="datetimeFigureOut">
               <a:rPr lang="en-US" smtClean="0"/>
               <a:pPr/>
-              <a:t>9/26/19</a:t>
+              <a:t>9/30/19</a:t>
             </a:fld>
             <a:endParaRPr lang="en-US" dirty="0"/>
           </a:p>
@@ -7664,7 +7663,7 @@
             <a:fld id="{B61BEF0D-F0BB-DE4B-95CE-6DB70DBA9567}" type="datetimeFigureOut">
               <a:rPr lang="en-US" smtClean="0"/>
               <a:pPr/>
-              <a:t>9/26/19</a:t>
+              <a:t>9/30/19</a:t>
             </a:fld>
             <a:endParaRPr lang="en-US" dirty="0"/>
           </a:p>
@@ -7898,7 +7897,7 @@
             <a:fld id="{B61BEF0D-F0BB-DE4B-95CE-6DB70DBA9567}" type="datetimeFigureOut">
               <a:rPr lang="en-US" smtClean="0"/>
               <a:pPr/>
-              <a:t>9/26/19</a:t>
+              <a:t>9/30/19</a:t>
             </a:fld>
             <a:endParaRPr lang="en-US" dirty="0"/>
           </a:p>
@@ -8285,7 +8284,7 @@
             <a:fld id="{B61BEF0D-F0BB-DE4B-95CE-6DB70DBA9567}" type="datetimeFigureOut">
               <a:rPr lang="en-US" smtClean="0"/>
               <a:pPr/>
-              <a:t>9/26/19</a:t>
+              <a:t>9/30/19</a:t>
             </a:fld>
             <a:endParaRPr lang="en-US" dirty="0"/>
           </a:p>
@@ -8405,7 +8404,7 @@
             <a:fld id="{B61BEF0D-F0BB-DE4B-95CE-6DB70DBA9567}" type="datetimeFigureOut">
               <a:rPr lang="en-US" smtClean="0"/>
               <a:pPr/>
-              <a:t>9/26/19</a:t>
+              <a:t>9/30/19</a:t>
             </a:fld>
             <a:endParaRPr lang="en-US" dirty="0"/>
           </a:p>
@@ -8502,7 +8501,7 @@
             <a:fld id="{B61BEF0D-F0BB-DE4B-95CE-6DB70DBA9567}" type="datetimeFigureOut">
               <a:rPr lang="en-US" smtClean="0"/>
               <a:pPr/>
-              <a:t>9/26/19</a:t>
+              <a:t>9/30/19</a:t>
             </a:fld>
             <a:endParaRPr lang="en-US" dirty="0"/>
           </a:p>
@@ -8753,7 +8752,7 @@
             <a:fld id="{B61BEF0D-F0BB-DE4B-95CE-6DB70DBA9567}" type="datetimeFigureOut">
               <a:rPr lang="en-US" smtClean="0"/>
               <a:pPr/>
-              <a:t>9/26/19</a:t>
+              <a:t>9/30/19</a:t>
             </a:fld>
             <a:endParaRPr lang="en-US" dirty="0"/>
           </a:p>
@@ -9040,7 +9039,7 @@
             <a:fld id="{B61BEF0D-F0BB-DE4B-95CE-6DB70DBA9567}" type="datetimeFigureOut">
               <a:rPr lang="en-US" smtClean="0"/>
               <a:pPr/>
-              <a:t>9/26/19</a:t>
+              <a:t>9/30/19</a:t>
             </a:fld>
             <a:endParaRPr lang="en-US" dirty="0"/>
           </a:p>
@@ -9164,7 +9163,7 @@
           <a:noFill/>
           <a:extLst>
             <a:ext uri="{909E8E84-426E-40dd-AFC4-6F175D3DCCD1}">
-              <a14:hiddenFill xmlns:a14="http://schemas.microsoft.com/office/drawing/2010/main" xmlns="">
+              <a14:hiddenFill xmlns="" xmlns:a14="http://schemas.microsoft.com/office/drawing/2010/main">
                 <a:solidFill>
                   <a:srgbClr val="FFFFFF"/>
                 </a:solidFill>
@@ -9238,7 +9237,7 @@
               </a:ln>
               <a:extLst>
                 <a:ext uri="{91240B29-F687-4f45-9708-019B960494DF}">
-                  <a14:hiddenLine xmlns:a14="http://schemas.microsoft.com/office/drawing/2010/main" xmlns="" w="9525">
+                  <a14:hiddenLine xmlns="" xmlns:a14="http://schemas.microsoft.com/office/drawing/2010/main" w="9525">
                     <a:solidFill>
                       <a:srgbClr val="000000"/>
                     </a:solidFill>
@@ -9328,7 +9327,7 @@
               </a:ln>
               <a:extLst>
                 <a:ext uri="{91240B29-F687-4f45-9708-019B960494DF}">
-                  <a14:hiddenLine xmlns:a14="http://schemas.microsoft.com/office/drawing/2010/main" xmlns="" w="9525">
+                  <a14:hiddenLine xmlns="" xmlns:a14="http://schemas.microsoft.com/office/drawing/2010/main" w="9525">
                     <a:solidFill>
                       <a:srgbClr val="000000"/>
                     </a:solidFill>
@@ -9418,7 +9417,7 @@
               </a:ln>
               <a:extLst>
                 <a:ext uri="{91240B29-F687-4f45-9708-019B960494DF}">
-                  <a14:hiddenLine xmlns:a14="http://schemas.microsoft.com/office/drawing/2010/main" xmlns="" w="9525">
+                  <a14:hiddenLine xmlns="" xmlns:a14="http://schemas.microsoft.com/office/drawing/2010/main" w="9525">
                     <a:solidFill>
                       <a:srgbClr val="000000"/>
                     </a:solidFill>
@@ -9480,7 +9479,7 @@
               </a:ln>
               <a:extLst>
                 <a:ext uri="{91240B29-F687-4f45-9708-019B960494DF}">
-                  <a14:hiddenLine xmlns:a14="http://schemas.microsoft.com/office/drawing/2010/main" xmlns="" w="9525">
+                  <a14:hiddenLine xmlns="" xmlns:a14="http://schemas.microsoft.com/office/drawing/2010/main" w="9525">
                     <a:solidFill>
                       <a:srgbClr val="000000"/>
                     </a:solidFill>
@@ -9570,7 +9569,7 @@
               </a:ln>
               <a:extLst>
                 <a:ext uri="{91240B29-F687-4f45-9708-019B960494DF}">
-                  <a14:hiddenLine xmlns:a14="http://schemas.microsoft.com/office/drawing/2010/main" xmlns="" w="9525">
+                  <a14:hiddenLine xmlns="" xmlns:a14="http://schemas.microsoft.com/office/drawing/2010/main" w="9525">
                     <a:solidFill>
                       <a:srgbClr val="000000"/>
                     </a:solidFill>
@@ -9632,7 +9631,7 @@
               </a:ln>
               <a:extLst>
                 <a:ext uri="{91240B29-F687-4f45-9708-019B960494DF}">
-                  <a14:hiddenLine xmlns:a14="http://schemas.microsoft.com/office/drawing/2010/main" xmlns="" w="9525">
+                  <a14:hiddenLine xmlns="" xmlns:a14="http://schemas.microsoft.com/office/drawing/2010/main" w="9525">
                     <a:solidFill>
                       <a:srgbClr val="000000"/>
                     </a:solidFill>
@@ -9694,7 +9693,7 @@
               </a:ln>
               <a:extLst>
                 <a:ext uri="{91240B29-F687-4f45-9708-019B960494DF}">
-                  <a14:hiddenLine xmlns:a14="http://schemas.microsoft.com/office/drawing/2010/main" xmlns="" w="9525">
+                  <a14:hiddenLine xmlns="" xmlns:a14="http://schemas.microsoft.com/office/drawing/2010/main" w="9525">
                     <a:solidFill>
                       <a:srgbClr val="000000"/>
                     </a:solidFill>
@@ -9784,7 +9783,7 @@
               </a:ln>
               <a:extLst>
                 <a:ext uri="{91240B29-F687-4f45-9708-019B960494DF}">
-                  <a14:hiddenLine xmlns:a14="http://schemas.microsoft.com/office/drawing/2010/main" xmlns="" w="9525">
+                  <a14:hiddenLine xmlns="" xmlns:a14="http://schemas.microsoft.com/office/drawing/2010/main" w="9525">
                     <a:solidFill>
                       <a:srgbClr val="000000"/>
                     </a:solidFill>
@@ -9874,7 +9873,7 @@
               </a:ln>
               <a:extLst>
                 <a:ext uri="{91240B29-F687-4f45-9708-019B960494DF}">
-                  <a14:hiddenLine xmlns:a14="http://schemas.microsoft.com/office/drawing/2010/main" xmlns="" w="9525">
+                  <a14:hiddenLine xmlns="" xmlns:a14="http://schemas.microsoft.com/office/drawing/2010/main" w="9525">
                     <a:solidFill>
                       <a:srgbClr val="000000"/>
                     </a:solidFill>
@@ -9936,7 +9935,7 @@
               </a:ln>
               <a:extLst>
                 <a:ext uri="{91240B29-F687-4f45-9708-019B960494DF}">
-                  <a14:hiddenLine xmlns:a14="http://schemas.microsoft.com/office/drawing/2010/main" xmlns="" w="9525">
+                  <a14:hiddenLine xmlns="" xmlns:a14="http://schemas.microsoft.com/office/drawing/2010/main" w="9525">
                     <a:solidFill>
                       <a:srgbClr val="000000"/>
                     </a:solidFill>
@@ -10046,7 +10045,7 @@
               </a:ln>
               <a:extLst>
                 <a:ext uri="{91240B29-F687-4f45-9708-019B960494DF}">
-                  <a14:hiddenLine xmlns:a14="http://schemas.microsoft.com/office/drawing/2010/main" xmlns="" w="9525">
+                  <a14:hiddenLine xmlns="" xmlns:a14="http://schemas.microsoft.com/office/drawing/2010/main" w="9525">
                     <a:solidFill>
                       <a:srgbClr val="000000"/>
                     </a:solidFill>
@@ -10130,7 +10129,7 @@
               </a:ln>
               <a:extLst>
                 <a:ext uri="{91240B29-F687-4f45-9708-019B960494DF}">
-                  <a14:hiddenLine xmlns:a14="http://schemas.microsoft.com/office/drawing/2010/main" xmlns="" w="9525">
+                  <a14:hiddenLine xmlns="" xmlns:a14="http://schemas.microsoft.com/office/drawing/2010/main" w="9525">
                     <a:solidFill>
                       <a:srgbClr val="000000"/>
                     </a:solidFill>
@@ -10192,7 +10191,7 @@
               </a:ln>
               <a:extLst>
                 <a:ext uri="{91240B29-F687-4f45-9708-019B960494DF}">
-                  <a14:hiddenLine xmlns:a14="http://schemas.microsoft.com/office/drawing/2010/main" xmlns="" w="9525">
+                  <a14:hiddenLine xmlns="" xmlns:a14="http://schemas.microsoft.com/office/drawing/2010/main" w="9525">
                     <a:solidFill>
                       <a:srgbClr val="000000"/>
                     </a:solidFill>
@@ -10254,7 +10253,7 @@
               </a:ln>
               <a:extLst>
                 <a:ext uri="{91240B29-F687-4f45-9708-019B960494DF}">
-                  <a14:hiddenLine xmlns:a14="http://schemas.microsoft.com/office/drawing/2010/main" xmlns="" w="9525">
+                  <a14:hiddenLine xmlns="" xmlns:a14="http://schemas.microsoft.com/office/drawing/2010/main" w="9525">
                     <a:solidFill>
                       <a:srgbClr val="000000"/>
                     </a:solidFill>
@@ -10344,7 +10343,7 @@
               </a:ln>
               <a:extLst>
                 <a:ext uri="{91240B29-F687-4f45-9708-019B960494DF}">
-                  <a14:hiddenLine xmlns:a14="http://schemas.microsoft.com/office/drawing/2010/main" xmlns="" w="9525">
+                  <a14:hiddenLine xmlns="" xmlns:a14="http://schemas.microsoft.com/office/drawing/2010/main" w="9525">
                     <a:solidFill>
                       <a:srgbClr val="000000"/>
                     </a:solidFill>
@@ -10378,7 +10377,7 @@
               </a:ln>
               <a:extLst>
                 <a:ext uri="{91240B29-F687-4f45-9708-019B960494DF}">
-                  <a14:hiddenLine xmlns:a14="http://schemas.microsoft.com/office/drawing/2010/main" xmlns="" w="9525">
+                  <a14:hiddenLine xmlns="" xmlns:a14="http://schemas.microsoft.com/office/drawing/2010/main" w="9525">
                     <a:solidFill>
                       <a:srgbClr val="000000"/>
                     </a:solidFill>
@@ -10443,7 +10442,7 @@
               </a:ln>
               <a:extLst>
                 <a:ext uri="{91240B29-F687-4f45-9708-019B960494DF}">
-                  <a14:hiddenLine xmlns:a14="http://schemas.microsoft.com/office/drawing/2010/main" xmlns="" w="9525">
+                  <a14:hiddenLine xmlns="" xmlns:a14="http://schemas.microsoft.com/office/drawing/2010/main" w="9525">
                     <a:solidFill>
                       <a:srgbClr val="000000"/>
                     </a:solidFill>
@@ -10533,7 +10532,7 @@
               </a:ln>
               <a:extLst>
                 <a:ext uri="{91240B29-F687-4f45-9708-019B960494DF}">
-                  <a14:hiddenLine xmlns:a14="http://schemas.microsoft.com/office/drawing/2010/main" xmlns="" w="9525">
+                  <a14:hiddenLine xmlns="" xmlns:a14="http://schemas.microsoft.com/office/drawing/2010/main" w="9525">
                     <a:solidFill>
                       <a:srgbClr val="000000"/>
                     </a:solidFill>
@@ -10595,7 +10594,7 @@
               </a:ln>
               <a:extLst>
                 <a:ext uri="{91240B29-F687-4f45-9708-019B960494DF}">
-                  <a14:hiddenLine xmlns:a14="http://schemas.microsoft.com/office/drawing/2010/main" xmlns="" w="9525">
+                  <a14:hiddenLine xmlns="" xmlns:a14="http://schemas.microsoft.com/office/drawing/2010/main" w="9525">
                     <a:solidFill>
                       <a:srgbClr val="000000"/>
                     </a:solidFill>
@@ -10685,7 +10684,7 @@
               </a:ln>
               <a:extLst>
                 <a:ext uri="{91240B29-F687-4f45-9708-019B960494DF}">
-                  <a14:hiddenLine xmlns:a14="http://schemas.microsoft.com/office/drawing/2010/main" xmlns="" w="9525">
+                  <a14:hiddenLine xmlns="" xmlns:a14="http://schemas.microsoft.com/office/drawing/2010/main" w="9525">
                     <a:solidFill>
                       <a:srgbClr val="000000"/>
                     </a:solidFill>
@@ -10750,7 +10749,7 @@
               </a:ln>
               <a:extLst>
                 <a:ext uri="{91240B29-F687-4f45-9708-019B960494DF}">
-                  <a14:hiddenLine xmlns:a14="http://schemas.microsoft.com/office/drawing/2010/main" xmlns="" w="9525">
+                  <a14:hiddenLine xmlns="" xmlns:a14="http://schemas.microsoft.com/office/drawing/2010/main" w="9525">
                     <a:solidFill>
                       <a:srgbClr val="000000"/>
                     </a:solidFill>
@@ -10812,7 +10811,7 @@
               </a:ln>
               <a:extLst>
                 <a:ext uri="{91240B29-F687-4f45-9708-019B960494DF}">
-                  <a14:hiddenLine xmlns:a14="http://schemas.microsoft.com/office/drawing/2010/main" xmlns="" w="9525">
+                  <a14:hiddenLine xmlns="" xmlns:a14="http://schemas.microsoft.com/office/drawing/2010/main" w="9525">
                     <a:solidFill>
                       <a:srgbClr val="000000"/>
                     </a:solidFill>
@@ -10902,7 +10901,7 @@
               </a:ln>
               <a:extLst>
                 <a:ext uri="{91240B29-F687-4f45-9708-019B960494DF}">
-                  <a14:hiddenLine xmlns:a14="http://schemas.microsoft.com/office/drawing/2010/main" xmlns="" w="9525">
+                  <a14:hiddenLine xmlns="" xmlns:a14="http://schemas.microsoft.com/office/drawing/2010/main" w="9525">
                     <a:solidFill>
                       <a:srgbClr val="000000"/>
                     </a:solidFill>
@@ -10992,7 +10991,7 @@
               </a:ln>
               <a:extLst>
                 <a:ext uri="{91240B29-F687-4f45-9708-019B960494DF}">
-                  <a14:hiddenLine xmlns:a14="http://schemas.microsoft.com/office/drawing/2010/main" xmlns="" w="9525">
+                  <a14:hiddenLine xmlns="" xmlns:a14="http://schemas.microsoft.com/office/drawing/2010/main" w="9525">
                     <a:solidFill>
                       <a:srgbClr val="000000"/>
                     </a:solidFill>
@@ -11057,7 +11056,7 @@
               </a:ln>
               <a:extLst>
                 <a:ext uri="{91240B29-F687-4f45-9708-019B960494DF}">
-                  <a14:hiddenLine xmlns:a14="http://schemas.microsoft.com/office/drawing/2010/main" xmlns="" w="9525">
+                  <a14:hiddenLine xmlns="" xmlns:a14="http://schemas.microsoft.com/office/drawing/2010/main" w="9525">
                     <a:solidFill>
                       <a:srgbClr val="000000"/>
                     </a:solidFill>
@@ -11177,7 +11176,7 @@
               </a:ln>
               <a:extLst>
                 <a:ext uri="{91240B29-F687-4f45-9708-019B960494DF}">
-                  <a14:hiddenLine xmlns:a14="http://schemas.microsoft.com/office/drawing/2010/main" xmlns="" w="9525">
+                  <a14:hiddenLine xmlns="" xmlns:a14="http://schemas.microsoft.com/office/drawing/2010/main" w="9525">
                     <a:solidFill>
                       <a:srgbClr val="000000"/>
                     </a:solidFill>
@@ -11258,7 +11257,7 @@
               </a:ln>
               <a:extLst>
                 <a:ext uri="{91240B29-F687-4f45-9708-019B960494DF}">
-                  <a14:hiddenLine xmlns:a14="http://schemas.microsoft.com/office/drawing/2010/main" xmlns="" w="9525">
+                  <a14:hiddenLine xmlns="" xmlns:a14="http://schemas.microsoft.com/office/drawing/2010/main" w="9525">
                     <a:solidFill>
                       <a:srgbClr val="000000"/>
                     </a:solidFill>
@@ -11373,7 +11372,7 @@
               </a:ln>
               <a:extLst>
                 <a:ext uri="{91240B29-F687-4f45-9708-019B960494DF}">
-                  <a14:hiddenLine xmlns:a14="http://schemas.microsoft.com/office/drawing/2010/main" xmlns="" w="9525">
+                  <a14:hiddenLine xmlns="" xmlns:a14="http://schemas.microsoft.com/office/drawing/2010/main" w="9525">
                     <a:solidFill>
                       <a:srgbClr val="000000"/>
                     </a:solidFill>
@@ -11463,7 +11462,7 @@
               </a:ln>
               <a:extLst>
                 <a:ext uri="{91240B29-F687-4f45-9708-019B960494DF}">
-                  <a14:hiddenLine xmlns:a14="http://schemas.microsoft.com/office/drawing/2010/main" xmlns="" w="9525">
+                  <a14:hiddenLine xmlns="" xmlns:a14="http://schemas.microsoft.com/office/drawing/2010/main" w="9525">
                     <a:solidFill>
                       <a:srgbClr val="000000"/>
                     </a:solidFill>
@@ -11528,7 +11527,7 @@
               </a:ln>
               <a:extLst>
                 <a:ext uri="{91240B29-F687-4f45-9708-019B960494DF}">
-                  <a14:hiddenLine xmlns:a14="http://schemas.microsoft.com/office/drawing/2010/main" xmlns="" w="9525">
+                  <a14:hiddenLine xmlns="" xmlns:a14="http://schemas.microsoft.com/office/drawing/2010/main" w="9525">
                     <a:solidFill>
                       <a:srgbClr val="000000"/>
                     </a:solidFill>
@@ -11618,7 +11617,7 @@
               </a:ln>
               <a:extLst>
                 <a:ext uri="{91240B29-F687-4f45-9708-019B960494DF}">
-                  <a14:hiddenLine xmlns:a14="http://schemas.microsoft.com/office/drawing/2010/main" xmlns="" w="9525">
+                  <a14:hiddenLine xmlns="" xmlns:a14="http://schemas.microsoft.com/office/drawing/2010/main" w="9525">
                     <a:solidFill>
                       <a:srgbClr val="000000"/>
                     </a:solidFill>
@@ -11686,7 +11685,7 @@
               </a:ln>
               <a:extLst>
                 <a:ext uri="{91240B29-F687-4f45-9708-019B960494DF}">
-                  <a14:hiddenLine xmlns:a14="http://schemas.microsoft.com/office/drawing/2010/main" xmlns="" w="9525">
+                  <a14:hiddenLine xmlns="" xmlns:a14="http://schemas.microsoft.com/office/drawing/2010/main" w="9525">
                     <a:solidFill>
                       <a:srgbClr val="000000"/>
                     </a:solidFill>
@@ -11776,7 +11775,7 @@
               </a:ln>
               <a:extLst>
                 <a:ext uri="{91240B29-F687-4f45-9708-019B960494DF}">
-                  <a14:hiddenLine xmlns:a14="http://schemas.microsoft.com/office/drawing/2010/main" xmlns="" w="9525">
+                  <a14:hiddenLine xmlns="" xmlns:a14="http://schemas.microsoft.com/office/drawing/2010/main" w="9525">
                     <a:solidFill>
                       <a:srgbClr val="000000"/>
                     </a:solidFill>
@@ -11844,7 +11843,7 @@
               </a:ln>
               <a:extLst>
                 <a:ext uri="{91240B29-F687-4f45-9708-019B960494DF}">
-                  <a14:hiddenLine xmlns:a14="http://schemas.microsoft.com/office/drawing/2010/main" xmlns="" w="9525">
+                  <a14:hiddenLine xmlns="" xmlns:a14="http://schemas.microsoft.com/office/drawing/2010/main" w="9525">
                     <a:solidFill>
                       <a:srgbClr val="000000"/>
                     </a:solidFill>
@@ -11934,7 +11933,7 @@
               </a:ln>
               <a:extLst>
                 <a:ext uri="{91240B29-F687-4f45-9708-019B960494DF}">
-                  <a14:hiddenLine xmlns:a14="http://schemas.microsoft.com/office/drawing/2010/main" xmlns="" w="9525">
+                  <a14:hiddenLine xmlns="" xmlns:a14="http://schemas.microsoft.com/office/drawing/2010/main" w="9525">
                     <a:solidFill>
                       <a:srgbClr val="000000"/>
                     </a:solidFill>
@@ -11968,7 +11967,7 @@
               </a:ln>
               <a:extLst>
                 <a:ext uri="{91240B29-F687-4f45-9708-019B960494DF}">
-                  <a14:hiddenLine xmlns:a14="http://schemas.microsoft.com/office/drawing/2010/main" xmlns="" w="9525">
+                  <a14:hiddenLine xmlns="" xmlns:a14="http://schemas.microsoft.com/office/drawing/2010/main" w="9525">
                     <a:solidFill>
                       <a:srgbClr val="000000"/>
                     </a:solidFill>
@@ -12108,7 +12107,7 @@
             <a:fld id="{B61BEF0D-F0BB-DE4B-95CE-6DB70DBA9567}" type="datetimeFigureOut">
               <a:rPr lang="en-US" smtClean="0"/>
               <a:pPr/>
-              <a:t>9/26/19</a:t>
+              <a:t>9/30/19</a:t>
             </a:fld>
             <a:endParaRPr lang="en-US" dirty="0"/>
           </a:p>
@@ -16521,97 +16520,6 @@
           <p:cNvPr id="2" name="Title 1">
             <a:extLst>
               <a:ext uri="{FF2B5EF4-FFF2-40B4-BE49-F238E27FC236}">
-                <a16:creationId xmlns:a16="http://schemas.microsoft.com/office/drawing/2014/main" id="{04FBA98F-4D31-8A48-9611-B3D2F58690E1}"/>
-              </a:ext>
-            </a:extLst>
-          </p:cNvPr>
-          <p:cNvSpPr>
-            <a:spLocks noGrp="1"/>
-          </p:cNvSpPr>
-          <p:nvPr>
-            <p:ph type="title"/>
-          </p:nvPr>
-        </p:nvSpPr>
-        <p:spPr/>
-        <p:txBody>
-          <a:bodyPr/>
-          <a:lstStyle/>
-          <a:p>
-            <a:r>
-              <a:rPr lang="en-US" dirty="0"/>
-              <a:t>Evaluating the bridge</a:t>
-            </a:r>
-          </a:p>
-        </p:txBody>
-      </p:sp>
-      <p:pic>
-        <p:nvPicPr>
-          <p:cNvPr id="5" name="Picture 4">
-            <a:extLst>
-              <a:ext uri="{FF2B5EF4-FFF2-40B4-BE49-F238E27FC236}">
-                <a16:creationId xmlns:a16="http://schemas.microsoft.com/office/drawing/2014/main" id="{9FA4AAA4-3A53-1349-A039-8BBA1C2C7E23}"/>
-              </a:ext>
-            </a:extLst>
-          </p:cNvPr>
-          <p:cNvPicPr>
-            <a:picLocks noChangeAspect="1"/>
-          </p:cNvPicPr>
-          <p:nvPr/>
-        </p:nvPicPr>
-        <p:blipFill>
-          <a:blip r:embed="rId2"/>
-          <a:stretch>
-            <a:fillRect/>
-          </a:stretch>
-        </p:blipFill>
-        <p:spPr>
-          <a:xfrm>
-            <a:off x="1628774" y="1868488"/>
-            <a:ext cx="8931276" cy="4707234"/>
-          </a:xfrm>
-          <a:prstGeom prst="rect">
-            <a:avLst/>
-          </a:prstGeom>
-          <a:solidFill>
-            <a:schemeClr val="accent2"/>
-          </a:solidFill>
-        </p:spPr>
-      </p:pic>
-    </p:spTree>
-    <p:extLst>
-      <p:ext uri="{BB962C8B-B14F-4D97-AF65-F5344CB8AC3E}">
-        <p14:creationId xmlns:p14="http://schemas.microsoft.com/office/powerpoint/2010/main" val="82279628"/>
-      </p:ext>
-    </p:extLst>
-  </p:cSld>
-  <p:clrMapOvr>
-    <a:masterClrMapping/>
-  </p:clrMapOvr>
-</p:sld>
-</file>
-
-<file path=ppt/slides/slide26.xml><?xml version="1.0" encoding="utf-8"?>
-<p:sld xmlns:a="http://schemas.openxmlformats.org/drawingml/2006/main" xmlns:r="http://schemas.openxmlformats.org/officeDocument/2006/relationships" xmlns:p="http://schemas.openxmlformats.org/presentationml/2006/main">
-  <p:cSld>
-    <p:spTree>
-      <p:nvGrpSpPr>
-        <p:cNvPr id="1" name=""/>
-        <p:cNvGrpSpPr/>
-        <p:nvPr/>
-      </p:nvGrpSpPr>
-      <p:grpSpPr>
-        <a:xfrm>
-          <a:off x="0" y="0"/>
-          <a:ext cx="0" cy="0"/>
-          <a:chOff x="0" y="0"/>
-          <a:chExt cx="0" cy="0"/>
-        </a:xfrm>
-      </p:grpSpPr>
-      <p:sp>
-        <p:nvSpPr>
-          <p:cNvPr id="2" name="Title 1">
-            <a:extLst>
-              <a:ext uri="{FF2B5EF4-FFF2-40B4-BE49-F238E27FC236}">
                 <a16:creationId xmlns:a16="http://schemas.microsoft.com/office/drawing/2014/main" id="{09482BFC-FCF3-2A4D-B08F-435EBC8F9C1F}"/>
               </a:ext>
             </a:extLst>

</xml_diff>